<commit_message>
Nhóm 4 bổ sung slide do sự cố mất điện
</commit_message>
<xml_diff>
--- a/silde/slide.pptx
+++ b/silde/slide.pptx
@@ -8,17 +8,16 @@
     <p:sldId id="273" r:id="rId2"/>
     <p:sldId id="260" r:id="rId3"/>
     <p:sldId id="276" r:id="rId4"/>
-    <p:sldId id="261" r:id="rId5"/>
-    <p:sldId id="264" r:id="rId6"/>
-    <p:sldId id="265" r:id="rId7"/>
-    <p:sldId id="268" r:id="rId8"/>
-    <p:sldId id="269" r:id="rId9"/>
-    <p:sldId id="270" r:id="rId10"/>
-    <p:sldId id="271" r:id="rId11"/>
-    <p:sldId id="272" r:id="rId12"/>
-    <p:sldId id="274" r:id="rId13"/>
-    <p:sldId id="275" r:id="rId14"/>
-    <p:sldId id="263" r:id="rId15"/>
+    <p:sldId id="277" r:id="rId5"/>
+    <p:sldId id="261" r:id="rId6"/>
+    <p:sldId id="264" r:id="rId7"/>
+    <p:sldId id="265" r:id="rId8"/>
+    <p:sldId id="268" r:id="rId9"/>
+    <p:sldId id="269" r:id="rId10"/>
+    <p:sldId id="270" r:id="rId11"/>
+    <p:sldId id="271" r:id="rId12"/>
+    <p:sldId id="272" r:id="rId13"/>
+    <p:sldId id="263" r:id="rId14"/>
   </p:sldIdLst>
   <p:sldSz cx="12192000" cy="6858000"/>
   <p:notesSz cx="6858000" cy="9144000"/>
@@ -6510,6 +6509,46 @@
               </a:rPr>
               <a:t>Vũ</a:t>
             </a:r>
+            <a:r>
+              <a:rPr lang="en-US" sz="2800" dirty="0">
+                <a:solidFill>
+                  <a:srgbClr val="FF0000"/>
+                </a:solidFill>
+                <a:latin typeface="Times New Roman" panose="02020603050405020304" pitchFamily="18" charset="0"/>
+                <a:cs typeface="Times New Roman" panose="02020603050405020304" pitchFamily="18" charset="0"/>
+              </a:rPr>
+              <a:t> – VNPT </a:t>
+            </a:r>
+            <a:r>
+              <a:rPr lang="en-US" sz="2800" dirty="0" err="1">
+                <a:solidFill>
+                  <a:srgbClr val="FF0000"/>
+                </a:solidFill>
+                <a:latin typeface="Times New Roman" panose="02020603050405020304" pitchFamily="18" charset="0"/>
+                <a:cs typeface="Times New Roman" panose="02020603050405020304" pitchFamily="18" charset="0"/>
+              </a:rPr>
+              <a:t>Đồng</a:t>
+            </a:r>
+            <a:r>
+              <a:rPr lang="en-US" sz="2800" dirty="0">
+                <a:solidFill>
+                  <a:srgbClr val="FF0000"/>
+                </a:solidFill>
+                <a:latin typeface="Times New Roman" panose="02020603050405020304" pitchFamily="18" charset="0"/>
+                <a:cs typeface="Times New Roman" panose="02020603050405020304" pitchFamily="18" charset="0"/>
+              </a:rPr>
+              <a:t> </a:t>
+            </a:r>
+            <a:r>
+              <a:rPr lang="en-US" sz="2800" dirty="0" err="1">
+                <a:solidFill>
+                  <a:srgbClr val="FF0000"/>
+                </a:solidFill>
+                <a:latin typeface="Times New Roman" panose="02020603050405020304" pitchFamily="18" charset="0"/>
+                <a:cs typeface="Times New Roman" panose="02020603050405020304" pitchFamily="18" charset="0"/>
+              </a:rPr>
+              <a:t>Nai</a:t>
+            </a:r>
             <a:endParaRPr lang="en-US" sz="2800" dirty="0">
               <a:solidFill>
                 <a:srgbClr val="FF0000"/>
@@ -6540,6 +6579,366 @@
 </file>
 
 <file path=ppt/slides/slide10.xml><?xml version="1.0" encoding="utf-8"?>
+<p:sld xmlns:a="http://schemas.openxmlformats.org/drawingml/2006/main" xmlns:r="http://schemas.openxmlformats.org/officeDocument/2006/relationships" xmlns:p="http://schemas.openxmlformats.org/presentationml/2006/main">
+  <p:cSld>
+    <p:spTree>
+      <p:nvGrpSpPr>
+        <p:cNvPr id="1" name=""/>
+        <p:cNvGrpSpPr/>
+        <p:nvPr/>
+      </p:nvGrpSpPr>
+      <p:grpSpPr>
+        <a:xfrm>
+          <a:off x="0" y="0"/>
+          <a:ext cx="0" cy="0"/>
+          <a:chOff x="0" y="0"/>
+          <a:chExt cx="0" cy="0"/>
+        </a:xfrm>
+      </p:grpSpPr>
+      <p:sp>
+        <p:nvSpPr>
+          <p:cNvPr id="2" name="Title 1">
+            <a:extLst>
+              <a:ext uri="{FF2B5EF4-FFF2-40B4-BE49-F238E27FC236}">
+                <a16:creationId xmlns:a16="http://schemas.microsoft.com/office/drawing/2014/main" id="{E10E3F3B-30B1-4DE7-89A2-F52DE12DCBA7}"/>
+              </a:ext>
+            </a:extLst>
+          </p:cNvPr>
+          <p:cNvSpPr>
+            <a:spLocks noGrp="1"/>
+          </p:cNvSpPr>
+          <p:nvPr>
+            <p:ph type="title"/>
+          </p:nvPr>
+        </p:nvSpPr>
+        <p:spPr/>
+        <p:txBody>
+          <a:bodyPr/>
+          <a:lstStyle/>
+          <a:p>
+            <a:r>
+              <a:rPr lang="en-US" dirty="0">
+                <a:latin typeface="Arial" panose="020B0604020202020204" pitchFamily="34" charset="0"/>
+                <a:cs typeface="Arial" panose="020B0604020202020204" pitchFamily="34" charset="0"/>
+              </a:rPr>
+              <a:t>CRUD </a:t>
+            </a:r>
+            <a:r>
+              <a:rPr lang="en-US" dirty="0" err="1">
+                <a:latin typeface="Arial" panose="020B0604020202020204" pitchFamily="34" charset="0"/>
+                <a:cs typeface="Arial" panose="020B0604020202020204" pitchFamily="34" charset="0"/>
+              </a:rPr>
+              <a:t>Bài</a:t>
+            </a:r>
+            <a:r>
+              <a:rPr lang="en-US" dirty="0">
+                <a:latin typeface="Arial" panose="020B0604020202020204" pitchFamily="34" charset="0"/>
+                <a:cs typeface="Arial" panose="020B0604020202020204" pitchFamily="34" charset="0"/>
+              </a:rPr>
+              <a:t> </a:t>
+            </a:r>
+            <a:r>
+              <a:rPr lang="en-US" dirty="0" err="1">
+                <a:latin typeface="Arial" panose="020B0604020202020204" pitchFamily="34" charset="0"/>
+                <a:cs typeface="Arial" panose="020B0604020202020204" pitchFamily="34" charset="0"/>
+              </a:rPr>
+              <a:t>viết</a:t>
+            </a:r>
+            <a:r>
+              <a:rPr lang="en-US" dirty="0">
+                <a:latin typeface="Arial" panose="020B0604020202020204" pitchFamily="34" charset="0"/>
+                <a:cs typeface="Arial" panose="020B0604020202020204" pitchFamily="34" charset="0"/>
+              </a:rPr>
+              <a:t>(4)</a:t>
+            </a:r>
+          </a:p>
+        </p:txBody>
+      </p:sp>
+      <p:sp>
+        <p:nvSpPr>
+          <p:cNvPr id="3" name="Content Placeholder 2">
+            <a:extLst>
+              <a:ext uri="{FF2B5EF4-FFF2-40B4-BE49-F238E27FC236}">
+                <a16:creationId xmlns:a16="http://schemas.microsoft.com/office/drawing/2014/main" id="{C9D1A361-AB7C-46C0-8D79-1F1474F25B07}"/>
+              </a:ext>
+            </a:extLst>
+          </p:cNvPr>
+          <p:cNvSpPr>
+            <a:spLocks noGrp="1"/>
+          </p:cNvSpPr>
+          <p:nvPr>
+            <p:ph idx="1"/>
+          </p:nvPr>
+        </p:nvSpPr>
+        <p:spPr/>
+        <p:txBody>
+          <a:bodyPr/>
+          <a:lstStyle/>
+          <a:p>
+            <a:r>
+              <a:rPr lang="en-US" dirty="0" err="1">
+                <a:latin typeface="Times New Roman" panose="02020603050405020304" pitchFamily="18" charset="0"/>
+                <a:cs typeface="Times New Roman" panose="02020603050405020304" pitchFamily="18" charset="0"/>
+              </a:rPr>
+              <a:t>Phân</a:t>
+            </a:r>
+            <a:r>
+              <a:rPr lang="en-US" dirty="0">
+                <a:latin typeface="Times New Roman" panose="02020603050405020304" pitchFamily="18" charset="0"/>
+                <a:cs typeface="Times New Roman" panose="02020603050405020304" pitchFamily="18" charset="0"/>
+              </a:rPr>
+              <a:t> </a:t>
+            </a:r>
+            <a:r>
+              <a:rPr lang="en-US" dirty="0" err="1">
+                <a:latin typeface="Times New Roman" panose="02020603050405020304" pitchFamily="18" charset="0"/>
+                <a:cs typeface="Times New Roman" panose="02020603050405020304" pitchFamily="18" charset="0"/>
+              </a:rPr>
+              <a:t>trang</a:t>
+            </a:r>
+            <a:endParaRPr lang="en-US" dirty="0">
+              <a:latin typeface="Times New Roman" panose="02020603050405020304" pitchFamily="18" charset="0"/>
+              <a:cs typeface="Times New Roman" panose="02020603050405020304" pitchFamily="18" charset="0"/>
+            </a:endParaRPr>
+          </a:p>
+          <a:p>
+            <a:pPr marL="36900" indent="0">
+              <a:buNone/>
+            </a:pPr>
+            <a:r>
+              <a:rPr lang="en-US" dirty="0" err="1">
+                <a:latin typeface="Times New Roman" panose="02020603050405020304" pitchFamily="18" charset="0"/>
+                <a:cs typeface="Times New Roman" panose="02020603050405020304" pitchFamily="18" charset="0"/>
+              </a:rPr>
+              <a:t>Mặc</a:t>
+            </a:r>
+            <a:r>
+              <a:rPr lang="en-US" dirty="0">
+                <a:latin typeface="Times New Roman" panose="02020603050405020304" pitchFamily="18" charset="0"/>
+                <a:cs typeface="Times New Roman" panose="02020603050405020304" pitchFamily="18" charset="0"/>
+              </a:rPr>
+              <a:t> </a:t>
+            </a:r>
+            <a:r>
+              <a:rPr lang="en-US" dirty="0" err="1">
+                <a:latin typeface="Times New Roman" panose="02020603050405020304" pitchFamily="18" charset="0"/>
+                <a:cs typeface="Times New Roman" panose="02020603050405020304" pitchFamily="18" charset="0"/>
+              </a:rPr>
+              <a:t>định</a:t>
+            </a:r>
+            <a:r>
+              <a:rPr lang="en-US" dirty="0">
+                <a:latin typeface="Times New Roman" panose="02020603050405020304" pitchFamily="18" charset="0"/>
+                <a:cs typeface="Times New Roman" panose="02020603050405020304" pitchFamily="18" charset="0"/>
+              </a:rPr>
+              <a:t> </a:t>
+            </a:r>
+            <a:r>
+              <a:rPr lang="en-US" dirty="0" err="1">
+                <a:latin typeface="Times New Roman" panose="02020603050405020304" pitchFamily="18" charset="0"/>
+                <a:cs typeface="Times New Roman" panose="02020603050405020304" pitchFamily="18" charset="0"/>
+              </a:rPr>
+              <a:t>sử</a:t>
+            </a:r>
+            <a:r>
+              <a:rPr lang="en-US" dirty="0">
+                <a:latin typeface="Times New Roman" panose="02020603050405020304" pitchFamily="18" charset="0"/>
+                <a:cs typeface="Times New Roman" panose="02020603050405020304" pitchFamily="18" charset="0"/>
+              </a:rPr>
+              <a:t> </a:t>
+            </a:r>
+            <a:r>
+              <a:rPr lang="en-US" dirty="0" err="1">
+                <a:latin typeface="Times New Roman" panose="02020603050405020304" pitchFamily="18" charset="0"/>
+                <a:cs typeface="Times New Roman" panose="02020603050405020304" pitchFamily="18" charset="0"/>
+              </a:rPr>
+              <a:t>dụng</a:t>
+            </a:r>
+            <a:r>
+              <a:rPr lang="en-US" dirty="0">
+                <a:latin typeface="Times New Roman" panose="02020603050405020304" pitchFamily="18" charset="0"/>
+                <a:cs typeface="Times New Roman" panose="02020603050405020304" pitchFamily="18" charset="0"/>
+              </a:rPr>
+              <a:t> </a:t>
+            </a:r>
+            <a:r>
+              <a:rPr lang="en-US" dirty="0" err="1">
+                <a:latin typeface="Times New Roman" panose="02020603050405020304" pitchFamily="18" charset="0"/>
+                <a:cs typeface="Times New Roman" panose="02020603050405020304" pitchFamily="18" charset="0"/>
+              </a:rPr>
+              <a:t>PageSize</a:t>
+            </a:r>
+            <a:r>
+              <a:rPr lang="en-US" dirty="0">
+                <a:latin typeface="Times New Roman" panose="02020603050405020304" pitchFamily="18" charset="0"/>
+                <a:cs typeface="Times New Roman" panose="02020603050405020304" pitchFamily="18" charset="0"/>
+              </a:rPr>
+              <a:t> </a:t>
+            </a:r>
+            <a:r>
+              <a:rPr lang="en-US" dirty="0" err="1">
+                <a:latin typeface="Times New Roman" panose="02020603050405020304" pitchFamily="18" charset="0"/>
+                <a:cs typeface="Times New Roman" panose="02020603050405020304" pitchFamily="18" charset="0"/>
+              </a:rPr>
+              <a:t>tại</a:t>
+            </a:r>
+            <a:r>
+              <a:rPr lang="en-US" dirty="0">
+                <a:latin typeface="Times New Roman" panose="02020603050405020304" pitchFamily="18" charset="0"/>
+                <a:cs typeface="Times New Roman" panose="02020603050405020304" pitchFamily="18" charset="0"/>
+              </a:rPr>
+              <a:t> config</a:t>
+            </a:r>
+          </a:p>
+          <a:p>
+            <a:pPr marL="36900" indent="0">
+              <a:buNone/>
+            </a:pPr>
+            <a:r>
+              <a:rPr lang="en-US" dirty="0" err="1">
+                <a:latin typeface="Times New Roman" panose="02020603050405020304" pitchFamily="18" charset="0"/>
+                <a:cs typeface="Times New Roman" panose="02020603050405020304" pitchFamily="18" charset="0"/>
+              </a:rPr>
+              <a:t>Có</a:t>
+            </a:r>
+            <a:r>
+              <a:rPr lang="en-US" dirty="0">
+                <a:latin typeface="Times New Roman" panose="02020603050405020304" pitchFamily="18" charset="0"/>
+                <a:cs typeface="Times New Roman" panose="02020603050405020304" pitchFamily="18" charset="0"/>
+              </a:rPr>
+              <a:t> </a:t>
+            </a:r>
+            <a:r>
+              <a:rPr lang="en-US" dirty="0" err="1">
+                <a:latin typeface="Times New Roman" panose="02020603050405020304" pitchFamily="18" charset="0"/>
+                <a:cs typeface="Times New Roman" panose="02020603050405020304" pitchFamily="18" charset="0"/>
+              </a:rPr>
+              <a:t>thể</a:t>
+            </a:r>
+            <a:r>
+              <a:rPr lang="en-US" dirty="0">
+                <a:latin typeface="Times New Roman" panose="02020603050405020304" pitchFamily="18" charset="0"/>
+                <a:cs typeface="Times New Roman" panose="02020603050405020304" pitchFamily="18" charset="0"/>
+              </a:rPr>
+              <a:t> </a:t>
+            </a:r>
+            <a:r>
+              <a:rPr lang="en-US" dirty="0" err="1">
+                <a:latin typeface="Times New Roman" panose="02020603050405020304" pitchFamily="18" charset="0"/>
+                <a:cs typeface="Times New Roman" panose="02020603050405020304" pitchFamily="18" charset="0"/>
+              </a:rPr>
+              <a:t>thay</a:t>
+            </a:r>
+            <a:r>
+              <a:rPr lang="en-US" dirty="0">
+                <a:latin typeface="Times New Roman" panose="02020603050405020304" pitchFamily="18" charset="0"/>
+                <a:cs typeface="Times New Roman" panose="02020603050405020304" pitchFamily="18" charset="0"/>
+              </a:rPr>
+              <a:t> </a:t>
+            </a:r>
+            <a:r>
+              <a:rPr lang="en-US" dirty="0" err="1">
+                <a:latin typeface="Times New Roman" panose="02020603050405020304" pitchFamily="18" charset="0"/>
+                <a:cs typeface="Times New Roman" panose="02020603050405020304" pitchFamily="18" charset="0"/>
+              </a:rPr>
+              <a:t>đổi</a:t>
+            </a:r>
+            <a:r>
+              <a:rPr lang="en-US" dirty="0">
+                <a:latin typeface="Times New Roman" panose="02020603050405020304" pitchFamily="18" charset="0"/>
+                <a:cs typeface="Times New Roman" panose="02020603050405020304" pitchFamily="18" charset="0"/>
+              </a:rPr>
+              <a:t> </a:t>
+            </a:r>
+            <a:r>
+              <a:rPr lang="en-US" dirty="0" err="1">
+                <a:latin typeface="Times New Roman" panose="02020603050405020304" pitchFamily="18" charset="0"/>
+                <a:cs typeface="Times New Roman" panose="02020603050405020304" pitchFamily="18" charset="0"/>
+              </a:rPr>
+              <a:t>pageSize</a:t>
+            </a:r>
+            <a:r>
+              <a:rPr lang="en-US" dirty="0">
+                <a:latin typeface="Times New Roman" panose="02020603050405020304" pitchFamily="18" charset="0"/>
+                <a:cs typeface="Times New Roman" panose="02020603050405020304" pitchFamily="18" charset="0"/>
+              </a:rPr>
+              <a:t> </a:t>
+            </a:r>
+            <a:r>
+              <a:rPr lang="en-US" dirty="0" err="1">
+                <a:latin typeface="Times New Roman" panose="02020603050405020304" pitchFamily="18" charset="0"/>
+                <a:cs typeface="Times New Roman" panose="02020603050405020304" pitchFamily="18" charset="0"/>
+              </a:rPr>
+              <a:t>ngay</a:t>
+            </a:r>
+            <a:r>
+              <a:rPr lang="en-US" dirty="0">
+                <a:latin typeface="Times New Roman" panose="02020603050405020304" pitchFamily="18" charset="0"/>
+                <a:cs typeface="Times New Roman" panose="02020603050405020304" pitchFamily="18" charset="0"/>
+              </a:rPr>
+              <a:t> </a:t>
+            </a:r>
+            <a:r>
+              <a:rPr lang="en-US" dirty="0" err="1">
+                <a:latin typeface="Times New Roman" panose="02020603050405020304" pitchFamily="18" charset="0"/>
+                <a:cs typeface="Times New Roman" panose="02020603050405020304" pitchFamily="18" charset="0"/>
+              </a:rPr>
+              <a:t>trên</a:t>
+            </a:r>
+            <a:r>
+              <a:rPr lang="en-US" dirty="0">
+                <a:latin typeface="Times New Roman" panose="02020603050405020304" pitchFamily="18" charset="0"/>
+                <a:cs typeface="Times New Roman" panose="02020603050405020304" pitchFamily="18" charset="0"/>
+              </a:rPr>
+              <a:t> index</a:t>
+            </a:r>
+          </a:p>
+        </p:txBody>
+      </p:sp>
+      <p:pic>
+        <p:nvPicPr>
+          <p:cNvPr id="4" name="Picture 3">
+            <a:extLst>
+              <a:ext uri="{FF2B5EF4-FFF2-40B4-BE49-F238E27FC236}">
+                <a16:creationId xmlns:a16="http://schemas.microsoft.com/office/drawing/2014/main" id="{A72419BC-62F3-4A28-AC08-7CC13FFD3D47}"/>
+              </a:ext>
+            </a:extLst>
+          </p:cNvPr>
+          <p:cNvPicPr>
+            <a:picLocks noChangeAspect="1"/>
+          </p:cNvPicPr>
+          <p:nvPr/>
+        </p:nvPicPr>
+        <p:blipFill>
+          <a:blip r:embed="rId2"/>
+          <a:stretch>
+            <a:fillRect/>
+          </a:stretch>
+        </p:blipFill>
+        <p:spPr>
+          <a:xfrm>
+            <a:off x="1045029" y="3788229"/>
+            <a:ext cx="10142375" cy="2883159"/>
+          </a:xfrm>
+          <a:prstGeom prst="rect">
+            <a:avLst/>
+          </a:prstGeom>
+        </p:spPr>
+      </p:pic>
+    </p:spTree>
+    <p:extLst>
+      <p:ext uri="{BB962C8B-B14F-4D97-AF65-F5344CB8AC3E}">
+        <p14:creationId xmlns:p14="http://schemas.microsoft.com/office/powerpoint/2010/main" val="203599150"/>
+      </p:ext>
+    </p:extLst>
+  </p:cSld>
+  <p:clrMapOvr>
+    <a:masterClrMapping/>
+  </p:clrMapOvr>
+</p:sld>
+</file>
+
+<file path=ppt/slides/slide11.xml><?xml version="1.0" encoding="utf-8"?>
 <p:sld xmlns:a="http://schemas.openxmlformats.org/drawingml/2006/main" xmlns:r="http://schemas.openxmlformats.org/officeDocument/2006/relationships" xmlns:p="http://schemas.openxmlformats.org/presentationml/2006/main">
   <p:cSld>
     <p:spTree>
@@ -7168,7 +7567,7 @@
 </p:sld>
 </file>
 
-<file path=ppt/slides/slide11.xml><?xml version="1.0" encoding="utf-8"?>
+<file path=ppt/slides/slide12.xml><?xml version="1.0" encoding="utf-8"?>
 <p:sld xmlns:a="http://schemas.openxmlformats.org/drawingml/2006/main" xmlns:r="http://schemas.openxmlformats.org/officeDocument/2006/relationships" xmlns:p="http://schemas.openxmlformats.org/presentationml/2006/main">
   <p:cSld>
     <p:spTree>
@@ -7663,86 +8062,6 @@
 </p:sld>
 </file>
 
-<file path=ppt/slides/slide12.xml><?xml version="1.0" encoding="utf-8"?>
-<p:sld xmlns:a="http://schemas.openxmlformats.org/drawingml/2006/main" xmlns:r="http://schemas.openxmlformats.org/officeDocument/2006/relationships" xmlns:p="http://schemas.openxmlformats.org/presentationml/2006/main">
-  <p:cSld>
-    <p:spTree>
-      <p:nvGrpSpPr>
-        <p:cNvPr id="1" name=""/>
-        <p:cNvGrpSpPr/>
-        <p:nvPr/>
-      </p:nvGrpSpPr>
-      <p:grpSpPr>
-        <a:xfrm>
-          <a:off x="0" y="0"/>
-          <a:ext cx="0" cy="0"/>
-          <a:chOff x="0" y="0"/>
-          <a:chExt cx="0" cy="0"/>
-        </a:xfrm>
-      </p:grpSpPr>
-      <p:sp>
-        <p:nvSpPr>
-          <p:cNvPr id="2" name="Title 1">
-            <a:extLst>
-              <a:ext uri="{FF2B5EF4-FFF2-40B4-BE49-F238E27FC236}">
-                <a16:creationId xmlns:a16="http://schemas.microsoft.com/office/drawing/2014/main" id="{9D515A79-46B9-488E-84D3-714A2158FC14}"/>
-              </a:ext>
-            </a:extLst>
-          </p:cNvPr>
-          <p:cNvSpPr>
-            <a:spLocks noGrp="1"/>
-          </p:cNvSpPr>
-          <p:nvPr>
-            <p:ph type="title"/>
-          </p:nvPr>
-        </p:nvSpPr>
-        <p:spPr/>
-        <p:txBody>
-          <a:bodyPr/>
-          <a:lstStyle/>
-          <a:p>
-            <a:endParaRPr lang="en-US"/>
-          </a:p>
-        </p:txBody>
-      </p:sp>
-      <p:sp>
-        <p:nvSpPr>
-          <p:cNvPr id="3" name="Content Placeholder 2">
-            <a:extLst>
-              <a:ext uri="{FF2B5EF4-FFF2-40B4-BE49-F238E27FC236}">
-                <a16:creationId xmlns:a16="http://schemas.microsoft.com/office/drawing/2014/main" id="{440F38F2-4FBD-4E77-9E35-C4C91D6F2BFF}"/>
-              </a:ext>
-            </a:extLst>
-          </p:cNvPr>
-          <p:cNvSpPr>
-            <a:spLocks noGrp="1"/>
-          </p:cNvSpPr>
-          <p:nvPr>
-            <p:ph idx="1"/>
-          </p:nvPr>
-        </p:nvSpPr>
-        <p:spPr/>
-        <p:txBody>
-          <a:bodyPr/>
-          <a:lstStyle/>
-          <a:p>
-            <a:endParaRPr lang="en-US"/>
-          </a:p>
-        </p:txBody>
-      </p:sp>
-    </p:spTree>
-    <p:extLst>
-      <p:ext uri="{BB962C8B-B14F-4D97-AF65-F5344CB8AC3E}">
-        <p14:creationId xmlns:p14="http://schemas.microsoft.com/office/powerpoint/2010/main" val="2783780921"/>
-      </p:ext>
-    </p:extLst>
-  </p:cSld>
-  <p:clrMapOvr>
-    <a:masterClrMapping/>
-  </p:clrMapOvr>
-</p:sld>
-</file>
-
 <file path=ppt/slides/slide13.xml><?xml version="1.0" encoding="utf-8"?>
 <p:sld xmlns:a="http://schemas.openxmlformats.org/drawingml/2006/main" xmlns:r="http://schemas.openxmlformats.org/officeDocument/2006/relationships" xmlns:p="http://schemas.openxmlformats.org/presentationml/2006/main">
   <p:cSld>
@@ -7765,86 +8084,6 @@
           <p:cNvPr id="2" name="Title 1">
             <a:extLst>
               <a:ext uri="{FF2B5EF4-FFF2-40B4-BE49-F238E27FC236}">
-                <a16:creationId xmlns:a16="http://schemas.microsoft.com/office/drawing/2014/main" id="{9715F3C8-2596-4A82-B521-EA96574C396D}"/>
-              </a:ext>
-            </a:extLst>
-          </p:cNvPr>
-          <p:cNvSpPr>
-            <a:spLocks noGrp="1"/>
-          </p:cNvSpPr>
-          <p:nvPr>
-            <p:ph type="title"/>
-          </p:nvPr>
-        </p:nvSpPr>
-        <p:spPr/>
-        <p:txBody>
-          <a:bodyPr/>
-          <a:lstStyle/>
-          <a:p>
-            <a:endParaRPr lang="en-US"/>
-          </a:p>
-        </p:txBody>
-      </p:sp>
-      <p:sp>
-        <p:nvSpPr>
-          <p:cNvPr id="3" name="Content Placeholder 2">
-            <a:extLst>
-              <a:ext uri="{FF2B5EF4-FFF2-40B4-BE49-F238E27FC236}">
-                <a16:creationId xmlns:a16="http://schemas.microsoft.com/office/drawing/2014/main" id="{091357D9-56CA-4A49-AF61-28A9E63CC6EA}"/>
-              </a:ext>
-            </a:extLst>
-          </p:cNvPr>
-          <p:cNvSpPr>
-            <a:spLocks noGrp="1"/>
-          </p:cNvSpPr>
-          <p:nvPr>
-            <p:ph idx="1"/>
-          </p:nvPr>
-        </p:nvSpPr>
-        <p:spPr/>
-        <p:txBody>
-          <a:bodyPr/>
-          <a:lstStyle/>
-          <a:p>
-            <a:endParaRPr lang="en-US"/>
-          </a:p>
-        </p:txBody>
-      </p:sp>
-    </p:spTree>
-    <p:extLst>
-      <p:ext uri="{BB962C8B-B14F-4D97-AF65-F5344CB8AC3E}">
-        <p14:creationId xmlns:p14="http://schemas.microsoft.com/office/powerpoint/2010/main" val="2527796682"/>
-      </p:ext>
-    </p:extLst>
-  </p:cSld>
-  <p:clrMapOvr>
-    <a:masterClrMapping/>
-  </p:clrMapOvr>
-</p:sld>
-</file>
-
-<file path=ppt/slides/slide14.xml><?xml version="1.0" encoding="utf-8"?>
-<p:sld xmlns:a="http://schemas.openxmlformats.org/drawingml/2006/main" xmlns:r="http://schemas.openxmlformats.org/officeDocument/2006/relationships" xmlns:p="http://schemas.openxmlformats.org/presentationml/2006/main">
-  <p:cSld>
-    <p:spTree>
-      <p:nvGrpSpPr>
-        <p:cNvPr id="1" name=""/>
-        <p:cNvGrpSpPr/>
-        <p:nvPr/>
-      </p:nvGrpSpPr>
-      <p:grpSpPr>
-        <a:xfrm>
-          <a:off x="0" y="0"/>
-          <a:ext cx="0" cy="0"/>
-          <a:chOff x="0" y="0"/>
-          <a:chExt cx="0" cy="0"/>
-        </a:xfrm>
-      </p:grpSpPr>
-      <p:sp>
-        <p:nvSpPr>
-          <p:cNvPr id="2" name="Title 1">
-            <a:extLst>
-              <a:ext uri="{FF2B5EF4-FFF2-40B4-BE49-F238E27FC236}">
                 <a16:creationId xmlns:a16="http://schemas.microsoft.com/office/drawing/2014/main" id="{EED3B0A3-1E53-4F98-99BD-C1E67DC8345B}"/>
               </a:ext>
             </a:extLst>
@@ -7858,9 +8097,80 @@
         </p:nvSpPr>
         <p:spPr/>
         <p:txBody>
-          <a:bodyPr/>
+          <a:bodyPr>
+            <a:normAutofit fontScale="90000"/>
+          </a:bodyPr>
           <a:lstStyle/>
           <a:p>
+            <a:r>
+              <a:rPr lang="en-US" sz="4800" dirty="0">
+                <a:latin typeface="Times New Roman" panose="02020603050405020304" pitchFamily="18" charset="0"/>
+                <a:cs typeface="Times New Roman" panose="02020603050405020304" pitchFamily="18" charset="0"/>
+              </a:rPr>
+              <a:t>Xin </a:t>
+            </a:r>
+            <a:r>
+              <a:rPr lang="en-US" sz="4800" dirty="0" err="1">
+                <a:latin typeface="Times New Roman" panose="02020603050405020304" pitchFamily="18" charset="0"/>
+                <a:cs typeface="Times New Roman" panose="02020603050405020304" pitchFamily="18" charset="0"/>
+              </a:rPr>
+              <a:t>chân</a:t>
+            </a:r>
+            <a:r>
+              <a:rPr lang="en-US" sz="4800" dirty="0">
+                <a:latin typeface="Times New Roman" panose="02020603050405020304" pitchFamily="18" charset="0"/>
+                <a:cs typeface="Times New Roman" panose="02020603050405020304" pitchFamily="18" charset="0"/>
+              </a:rPr>
+              <a:t> </a:t>
+            </a:r>
+            <a:r>
+              <a:rPr lang="en-US" sz="4800" dirty="0" err="1">
+                <a:latin typeface="Times New Roman" panose="02020603050405020304" pitchFamily="18" charset="0"/>
+                <a:cs typeface="Times New Roman" panose="02020603050405020304" pitchFamily="18" charset="0"/>
+              </a:rPr>
+              <a:t>thành</a:t>
+            </a:r>
+            <a:r>
+              <a:rPr lang="en-US" sz="4800" dirty="0">
+                <a:latin typeface="Times New Roman" panose="02020603050405020304" pitchFamily="18" charset="0"/>
+                <a:cs typeface="Times New Roman" panose="02020603050405020304" pitchFamily="18" charset="0"/>
+              </a:rPr>
+              <a:t> </a:t>
+            </a:r>
+            <a:r>
+              <a:rPr lang="en-US" sz="4800" dirty="0" err="1">
+                <a:latin typeface="Times New Roman" panose="02020603050405020304" pitchFamily="18" charset="0"/>
+                <a:cs typeface="Times New Roman" panose="02020603050405020304" pitchFamily="18" charset="0"/>
+              </a:rPr>
+              <a:t>cảm</a:t>
+            </a:r>
+            <a:r>
+              <a:rPr lang="en-US" sz="4800" dirty="0">
+                <a:latin typeface="Times New Roman" panose="02020603050405020304" pitchFamily="18" charset="0"/>
+                <a:cs typeface="Times New Roman" panose="02020603050405020304" pitchFamily="18" charset="0"/>
+              </a:rPr>
+              <a:t> </a:t>
+            </a:r>
+            <a:r>
+              <a:rPr lang="en-US" sz="4800" dirty="0" err="1">
+                <a:latin typeface="Times New Roman" panose="02020603050405020304" pitchFamily="18" charset="0"/>
+                <a:cs typeface="Times New Roman" panose="02020603050405020304" pitchFamily="18" charset="0"/>
+              </a:rPr>
+              <a:t>ơn</a:t>
+            </a:r>
+            <a:r>
+              <a:rPr lang="en-US" sz="4800" dirty="0">
+                <a:latin typeface="Times New Roman" panose="02020603050405020304" pitchFamily="18" charset="0"/>
+                <a:cs typeface="Times New Roman" panose="02020603050405020304" pitchFamily="18" charset="0"/>
+              </a:rPr>
+              <a:t>!</a:t>
+            </a:r>
+            <a:br>
+              <a:rPr lang="en-US" sz="4800" dirty="0">
+                <a:latin typeface="Times New Roman" panose="02020603050405020304" pitchFamily="18" charset="0"/>
+                <a:cs typeface="Times New Roman" panose="02020603050405020304" pitchFamily="18" charset="0"/>
+              </a:rPr>
+            </a:br>
             <a:endParaRPr lang="en-US" dirty="0"/>
           </a:p>
         </p:txBody>
@@ -7892,18 +8202,25 @@
               <a:buNone/>
             </a:pPr>
             <a:r>
+              <a:rPr lang="en-US" sz="6000" dirty="0" err="1">
+                <a:latin typeface="Times New Roman" panose="02020603050405020304" pitchFamily="18" charset="0"/>
+                <a:cs typeface="Times New Roman" panose="02020603050405020304" pitchFamily="18" charset="0"/>
+              </a:rPr>
+              <a:t>Chúc</a:t>
+            </a:r>
+            <a:r>
               <a:rPr lang="en-US" sz="6000" dirty="0">
                 <a:latin typeface="Times New Roman" panose="02020603050405020304" pitchFamily="18" charset="0"/>
                 <a:cs typeface="Times New Roman" panose="02020603050405020304" pitchFamily="18" charset="0"/>
               </a:rPr>
-              <a:t>Xin </a:t>
+              <a:t> </a:t>
             </a:r>
             <a:r>
               <a:rPr lang="en-US" sz="6000" dirty="0" err="1">
                 <a:latin typeface="Times New Roman" panose="02020603050405020304" pitchFamily="18" charset="0"/>
                 <a:cs typeface="Times New Roman" panose="02020603050405020304" pitchFamily="18" charset="0"/>
               </a:rPr>
-              <a:t>cảm</a:t>
+              <a:t>sức</a:t>
             </a:r>
             <a:r>
               <a:rPr lang="en-US" sz="6000" dirty="0">
@@ -7917,7 +8234,63 @@
                 <a:latin typeface="Times New Roman" panose="02020603050405020304" pitchFamily="18" charset="0"/>
                 <a:cs typeface="Times New Roman" panose="02020603050405020304" pitchFamily="18" charset="0"/>
               </a:rPr>
-              <a:t>ơn</a:t>
+              <a:t>khỏe</a:t>
+            </a:r>
+            <a:r>
+              <a:rPr lang="en-US" sz="6000" dirty="0">
+                <a:latin typeface="Times New Roman" panose="02020603050405020304" pitchFamily="18" charset="0"/>
+                <a:cs typeface="Times New Roman" panose="02020603050405020304" pitchFamily="18" charset="0"/>
+              </a:rPr>
+              <a:t> </a:t>
+            </a:r>
+            <a:r>
+              <a:rPr lang="en-US" sz="6000" dirty="0" err="1">
+                <a:latin typeface="Times New Roman" panose="02020603050405020304" pitchFamily="18" charset="0"/>
+                <a:cs typeface="Times New Roman" panose="02020603050405020304" pitchFamily="18" charset="0"/>
+              </a:rPr>
+              <a:t>và</a:t>
+            </a:r>
+            <a:r>
+              <a:rPr lang="en-US" sz="6000" dirty="0">
+                <a:latin typeface="Times New Roman" panose="02020603050405020304" pitchFamily="18" charset="0"/>
+                <a:cs typeface="Times New Roman" panose="02020603050405020304" pitchFamily="18" charset="0"/>
+              </a:rPr>
+              <a:t> </a:t>
+            </a:r>
+            <a:r>
+              <a:rPr lang="en-US" sz="6000" dirty="0" err="1">
+                <a:latin typeface="Times New Roman" panose="02020603050405020304" pitchFamily="18" charset="0"/>
+                <a:cs typeface="Times New Roman" panose="02020603050405020304" pitchFamily="18" charset="0"/>
+              </a:rPr>
+              <a:t>công</a:t>
+            </a:r>
+            <a:r>
+              <a:rPr lang="en-US" sz="6000" dirty="0">
+                <a:latin typeface="Times New Roman" panose="02020603050405020304" pitchFamily="18" charset="0"/>
+                <a:cs typeface="Times New Roman" panose="02020603050405020304" pitchFamily="18" charset="0"/>
+              </a:rPr>
+              <a:t> </a:t>
+            </a:r>
+            <a:r>
+              <a:rPr lang="en-US" sz="6000" dirty="0" err="1">
+                <a:latin typeface="Times New Roman" panose="02020603050405020304" pitchFamily="18" charset="0"/>
+                <a:cs typeface="Times New Roman" panose="02020603050405020304" pitchFamily="18" charset="0"/>
+              </a:rPr>
+              <a:t>tác</a:t>
+            </a:r>
+            <a:r>
+              <a:rPr lang="en-US" sz="6000" dirty="0">
+                <a:latin typeface="Times New Roman" panose="02020603050405020304" pitchFamily="18" charset="0"/>
+                <a:cs typeface="Times New Roman" panose="02020603050405020304" pitchFamily="18" charset="0"/>
+              </a:rPr>
+              <a:t> </a:t>
+            </a:r>
+            <a:r>
+              <a:rPr lang="en-US" sz="6000" dirty="0" err="1">
+                <a:latin typeface="Times New Roman" panose="02020603050405020304" pitchFamily="18" charset="0"/>
+                <a:cs typeface="Times New Roman" panose="02020603050405020304" pitchFamily="18" charset="0"/>
+              </a:rPr>
+              <a:t>tốt</a:t>
             </a:r>
             <a:endParaRPr lang="en-US" sz="6000" dirty="0">
               <a:latin typeface="Times New Roman" panose="02020603050405020304" pitchFamily="18" charset="0"/>
@@ -8080,51 +8453,81 @@
           <a:lstStyle/>
           <a:p>
             <a:r>
-              <a:rPr lang="en-US" dirty="0" err="1"/>
+              <a:rPr lang="en-US" dirty="0" err="1">
+                <a:latin typeface="Times New Roman" panose="02020603050405020304" pitchFamily="18" charset="0"/>
+                <a:cs typeface="Times New Roman" panose="02020603050405020304" pitchFamily="18" charset="0"/>
+              </a:rPr>
               <a:t>Tình</a:t>
             </a:r>
             <a:r>
-              <a:rPr lang="en-US" dirty="0"/>
-              <a:t> </a:t>
-            </a:r>
-            <a:r>
-              <a:rPr lang="en-US" dirty="0" err="1"/>
+              <a:rPr lang="en-US" dirty="0">
+                <a:latin typeface="Times New Roman" panose="02020603050405020304" pitchFamily="18" charset="0"/>
+                <a:cs typeface="Times New Roman" panose="02020603050405020304" pitchFamily="18" charset="0"/>
+              </a:rPr>
+              <a:t> </a:t>
+            </a:r>
+            <a:r>
+              <a:rPr lang="en-US" dirty="0" err="1">
+                <a:latin typeface="Times New Roman" panose="02020603050405020304" pitchFamily="18" charset="0"/>
+                <a:cs typeface="Times New Roman" panose="02020603050405020304" pitchFamily="18" charset="0"/>
+              </a:rPr>
               <a:t>hình</a:t>
             </a:r>
             <a:r>
-              <a:rPr lang="en-US" dirty="0"/>
-              <a:t> </a:t>
-            </a:r>
-            <a:r>
-              <a:rPr lang="en-US" dirty="0" err="1"/>
+              <a:rPr lang="en-US" dirty="0">
+                <a:latin typeface="Times New Roman" panose="02020603050405020304" pitchFamily="18" charset="0"/>
+                <a:cs typeface="Times New Roman" panose="02020603050405020304" pitchFamily="18" charset="0"/>
+              </a:rPr>
+              <a:t> </a:t>
+            </a:r>
+            <a:r>
+              <a:rPr lang="en-US" dirty="0" err="1">
+                <a:latin typeface="Times New Roman" panose="02020603050405020304" pitchFamily="18" charset="0"/>
+                <a:cs typeface="Times New Roman" panose="02020603050405020304" pitchFamily="18" charset="0"/>
+              </a:rPr>
               <a:t>Ncovid</a:t>
             </a:r>
             <a:r>
-              <a:rPr lang="en-US" dirty="0"/>
-              <a:t> </a:t>
-            </a:r>
-            <a:r>
-              <a:rPr lang="en-US" dirty="0" err="1"/>
+              <a:rPr lang="en-US" dirty="0">
+                <a:latin typeface="Times New Roman" panose="02020603050405020304" pitchFamily="18" charset="0"/>
+                <a:cs typeface="Times New Roman" panose="02020603050405020304" pitchFamily="18" charset="0"/>
+              </a:rPr>
+              <a:t> </a:t>
+            </a:r>
+            <a:r>
+              <a:rPr lang="en-US" dirty="0" err="1">
+                <a:latin typeface="Times New Roman" panose="02020603050405020304" pitchFamily="18" charset="0"/>
+                <a:cs typeface="Times New Roman" panose="02020603050405020304" pitchFamily="18" charset="0"/>
+              </a:rPr>
               <a:t>hiện</a:t>
             </a:r>
             <a:r>
-              <a:rPr lang="en-US" dirty="0"/>
-              <a:t> </a:t>
-            </a:r>
-            <a:r>
-              <a:rPr lang="en-US" dirty="0" err="1"/>
+              <a:rPr lang="en-US" dirty="0">
+                <a:latin typeface="Times New Roman" panose="02020603050405020304" pitchFamily="18" charset="0"/>
+                <a:cs typeface="Times New Roman" panose="02020603050405020304" pitchFamily="18" charset="0"/>
+              </a:rPr>
+              <a:t> </a:t>
+            </a:r>
+            <a:r>
+              <a:rPr lang="en-US" dirty="0" err="1">
+                <a:latin typeface="Times New Roman" panose="02020603050405020304" pitchFamily="18" charset="0"/>
+                <a:cs typeface="Times New Roman" panose="02020603050405020304" pitchFamily="18" charset="0"/>
+              </a:rPr>
               <a:t>tại</a:t>
             </a:r>
-            <a:endParaRPr lang="en-US" dirty="0"/>
-          </a:p>
-        </p:txBody>
-      </p:sp>
-      <p:sp>
-        <p:nvSpPr>
-          <p:cNvPr id="3" name="Content Placeholder 2">
+            <a:endParaRPr lang="en-US" dirty="0">
+              <a:latin typeface="Times New Roman" panose="02020603050405020304" pitchFamily="18" charset="0"/>
+              <a:cs typeface="Times New Roman" panose="02020603050405020304" pitchFamily="18" charset="0"/>
+            </a:endParaRPr>
+          </a:p>
+        </p:txBody>
+      </p:sp>
+      <p:sp>
+        <p:nvSpPr>
+          <p:cNvPr id="6" name="Content Placeholder 5">
             <a:extLst>
               <a:ext uri="{FF2B5EF4-FFF2-40B4-BE49-F238E27FC236}">
-                <a16:creationId xmlns:a16="http://schemas.microsoft.com/office/drawing/2014/main" id="{8C8C5680-5DA8-4AC1-B91E-3C4481FEBC5B}"/>
+                <a16:creationId xmlns:a16="http://schemas.microsoft.com/office/drawing/2014/main" id="{A1BE63B2-59D0-4C7F-AD8D-B2BE2897FC1D}"/>
               </a:ext>
             </a:extLst>
           </p:cNvPr>
@@ -8135,15 +8538,336 @@
             <p:ph idx="1"/>
           </p:nvPr>
         </p:nvSpPr>
-        <p:spPr/>
+        <p:spPr>
+          <a:xfrm>
+            <a:off x="913795" y="2076450"/>
+            <a:ext cx="6880799" cy="3714749"/>
+          </a:xfrm>
+        </p:spPr>
         <p:txBody>
           <a:bodyPr/>
           <a:lstStyle/>
           <a:p>
-            <a:endParaRPr lang="en-US"/>
-          </a:p>
-        </p:txBody>
-      </p:sp>
+            <a:r>
+              <a:rPr lang="en-US" dirty="0" err="1"/>
+              <a:t>Cập</a:t>
+            </a:r>
+            <a:r>
+              <a:rPr lang="en-US" dirty="0"/>
+              <a:t> </a:t>
+            </a:r>
+            <a:r>
+              <a:rPr lang="en-US" dirty="0" err="1"/>
+              <a:t>nhật</a:t>
+            </a:r>
+            <a:r>
+              <a:rPr lang="en-US" dirty="0"/>
+              <a:t> </a:t>
+            </a:r>
+            <a:r>
+              <a:rPr lang="en-US" dirty="0" err="1"/>
+              <a:t>được</a:t>
+            </a:r>
+            <a:r>
+              <a:rPr lang="en-US" dirty="0"/>
+              <a:t> </a:t>
+            </a:r>
+            <a:r>
+              <a:rPr lang="en-US" dirty="0" err="1"/>
+              <a:t>tình</a:t>
+            </a:r>
+            <a:r>
+              <a:rPr lang="en-US" dirty="0"/>
+              <a:t> </a:t>
+            </a:r>
+            <a:r>
+              <a:rPr lang="en-US" dirty="0" err="1"/>
+              <a:t>hình</a:t>
+            </a:r>
+            <a:r>
+              <a:rPr lang="en-US" dirty="0"/>
+              <a:t> </a:t>
+            </a:r>
+            <a:r>
+              <a:rPr lang="en-US" dirty="0" err="1"/>
+              <a:t>Covid</a:t>
+            </a:r>
+            <a:r>
+              <a:rPr lang="en-US" dirty="0"/>
+              <a:t> </a:t>
+            </a:r>
+            <a:r>
+              <a:rPr lang="en-US" dirty="0" err="1"/>
+              <a:t>hiện</a:t>
+            </a:r>
+            <a:r>
+              <a:rPr lang="en-US" dirty="0"/>
+              <a:t> </a:t>
+            </a:r>
+            <a:r>
+              <a:rPr lang="en-US" dirty="0" err="1"/>
+              <a:t>tại</a:t>
+            </a:r>
+            <a:endParaRPr lang="en-US" dirty="0"/>
+          </a:p>
+          <a:p>
+            <a:r>
+              <a:rPr lang="en-US" dirty="0" err="1"/>
+              <a:t>Tìm</a:t>
+            </a:r>
+            <a:r>
+              <a:rPr lang="en-US" dirty="0"/>
+              <a:t> </a:t>
+            </a:r>
+            <a:r>
+              <a:rPr lang="en-US" dirty="0" err="1"/>
+              <a:t>kiếm</a:t>
+            </a:r>
+            <a:r>
+              <a:rPr lang="en-US" dirty="0"/>
+              <a:t> </a:t>
+            </a:r>
+            <a:r>
+              <a:rPr lang="en-US" dirty="0" err="1"/>
+              <a:t>tra</a:t>
+            </a:r>
+            <a:r>
+              <a:rPr lang="en-US" dirty="0"/>
+              <a:t> </a:t>
+            </a:r>
+            <a:r>
+              <a:rPr lang="en-US" dirty="0" err="1"/>
+              <a:t>cứu</a:t>
+            </a:r>
+            <a:r>
+              <a:rPr lang="en-US" dirty="0"/>
+              <a:t> </a:t>
+            </a:r>
+            <a:r>
+              <a:rPr lang="en-US" dirty="0" err="1"/>
+              <a:t>thông</a:t>
+            </a:r>
+            <a:r>
+              <a:rPr lang="en-US" dirty="0"/>
+              <a:t> tin </a:t>
+            </a:r>
+            <a:r>
+              <a:rPr lang="en-US" dirty="0" err="1"/>
+              <a:t>theo</a:t>
+            </a:r>
+            <a:r>
+              <a:rPr lang="en-US" dirty="0"/>
+              <a:t> </a:t>
+            </a:r>
+            <a:r>
+              <a:rPr lang="en-US" dirty="0" err="1"/>
+              <a:t>từng</a:t>
+            </a:r>
+            <a:r>
+              <a:rPr lang="en-US" dirty="0"/>
+              <a:t> </a:t>
+            </a:r>
+            <a:r>
+              <a:rPr lang="en-US" dirty="0" err="1"/>
+              <a:t>quốc</a:t>
+            </a:r>
+            <a:r>
+              <a:rPr lang="en-US" dirty="0"/>
+              <a:t> </a:t>
+            </a:r>
+            <a:r>
+              <a:rPr lang="en-US" dirty="0" err="1"/>
+              <a:t>gia</a:t>
+            </a:r>
+            <a:endParaRPr lang="en-US" dirty="0"/>
+          </a:p>
+          <a:p>
+            <a:r>
+              <a:rPr lang="en-US" dirty="0" err="1"/>
+              <a:t>Các</a:t>
+            </a:r>
+            <a:r>
+              <a:rPr lang="en-US" dirty="0"/>
+              <a:t> </a:t>
+            </a:r>
+            <a:r>
+              <a:rPr lang="en-US" dirty="0" err="1"/>
+              <a:t>triệu</a:t>
+            </a:r>
+            <a:r>
+              <a:rPr lang="en-US" dirty="0"/>
+              <a:t> </a:t>
+            </a:r>
+            <a:r>
+              <a:rPr lang="en-US" dirty="0" err="1"/>
+              <a:t>chứng</a:t>
+            </a:r>
+            <a:r>
+              <a:rPr lang="en-US" dirty="0"/>
+              <a:t> </a:t>
+            </a:r>
+            <a:r>
+              <a:rPr lang="en-US" dirty="0" err="1"/>
+              <a:t>dấu</a:t>
+            </a:r>
+            <a:r>
+              <a:rPr lang="en-US" dirty="0"/>
+              <a:t> </a:t>
+            </a:r>
+            <a:r>
+              <a:rPr lang="en-US" dirty="0" err="1"/>
+              <a:t>hiệu</a:t>
+            </a:r>
+            <a:r>
+              <a:rPr lang="en-US" dirty="0"/>
+              <a:t> </a:t>
+            </a:r>
+            <a:r>
+              <a:rPr lang="en-US" dirty="0" err="1"/>
+              <a:t>khi</a:t>
+            </a:r>
+            <a:r>
+              <a:rPr lang="en-US" dirty="0"/>
+              <a:t> </a:t>
+            </a:r>
+            <a:r>
+              <a:rPr lang="en-US" dirty="0" err="1"/>
+              <a:t>nhiễm</a:t>
+            </a:r>
+            <a:r>
+              <a:rPr lang="en-US" dirty="0"/>
+              <a:t> </a:t>
+            </a:r>
+            <a:r>
+              <a:rPr lang="en-US" dirty="0" err="1"/>
+              <a:t>Covid</a:t>
+            </a:r>
+            <a:endParaRPr lang="en-US" dirty="0"/>
+          </a:p>
+          <a:p>
+            <a:r>
+              <a:rPr lang="en-US" dirty="0" err="1"/>
+              <a:t>Hướng</a:t>
+            </a:r>
+            <a:r>
+              <a:rPr lang="en-US" dirty="0"/>
+              <a:t> </a:t>
+            </a:r>
+            <a:r>
+              <a:rPr lang="en-US" dirty="0" err="1"/>
+              <a:t>dẫn</a:t>
+            </a:r>
+            <a:r>
+              <a:rPr lang="en-US" dirty="0"/>
+              <a:t> </a:t>
+            </a:r>
+            <a:r>
+              <a:rPr lang="en-US" dirty="0" err="1"/>
+              <a:t>các</a:t>
+            </a:r>
+            <a:r>
+              <a:rPr lang="en-US" dirty="0"/>
+              <a:t> </a:t>
+            </a:r>
+            <a:r>
+              <a:rPr lang="en-US" dirty="0" err="1"/>
+              <a:t>biện</a:t>
+            </a:r>
+            <a:r>
+              <a:rPr lang="en-US" dirty="0"/>
+              <a:t> </a:t>
+            </a:r>
+            <a:r>
+              <a:rPr lang="en-US" dirty="0" err="1"/>
+              <a:t>pháp</a:t>
+            </a:r>
+            <a:r>
+              <a:rPr lang="en-US" dirty="0"/>
+              <a:t> </a:t>
+            </a:r>
+            <a:r>
+              <a:rPr lang="en-US" dirty="0" err="1"/>
+              <a:t>phòng</a:t>
+            </a:r>
+            <a:r>
+              <a:rPr lang="en-US" dirty="0"/>
+              <a:t> </a:t>
+            </a:r>
+            <a:r>
+              <a:rPr lang="en-US" dirty="0" err="1"/>
+              <a:t>trách</a:t>
+            </a:r>
+            <a:r>
+              <a:rPr lang="en-US" dirty="0"/>
+              <a:t>.</a:t>
+            </a:r>
+          </a:p>
+          <a:p>
+            <a:r>
+              <a:rPr lang="en-US" dirty="0" err="1"/>
+              <a:t>Sử</a:t>
+            </a:r>
+            <a:r>
+              <a:rPr lang="en-US" dirty="0"/>
+              <a:t> </a:t>
+            </a:r>
+            <a:r>
+              <a:rPr lang="en-US" dirty="0" err="1"/>
+              <a:t>dụng</a:t>
+            </a:r>
+            <a:r>
+              <a:rPr lang="en-US" dirty="0"/>
+              <a:t> API </a:t>
+            </a:r>
+            <a:r>
+              <a:rPr lang="en-US" dirty="0" err="1"/>
+              <a:t>có</a:t>
+            </a:r>
+            <a:r>
+              <a:rPr lang="en-US" dirty="0"/>
+              <a:t> </a:t>
+            </a:r>
+            <a:r>
+              <a:rPr lang="en-US" dirty="0" err="1"/>
+              <a:t>sẵn</a:t>
+            </a:r>
+            <a:r>
+              <a:rPr lang="en-US" dirty="0"/>
+              <a:t> (https://api.covid19api.com)</a:t>
+            </a:r>
+          </a:p>
+        </p:txBody>
+      </p:sp>
+      <p:pic>
+        <p:nvPicPr>
+          <p:cNvPr id="7" name="Picture 6">
+            <a:extLst>
+              <a:ext uri="{FF2B5EF4-FFF2-40B4-BE49-F238E27FC236}">
+                <a16:creationId xmlns:a16="http://schemas.microsoft.com/office/drawing/2014/main" id="{487FFE51-24FE-41FB-A49A-219095F288D2}"/>
+              </a:ext>
+            </a:extLst>
+          </p:cNvPr>
+          <p:cNvPicPr>
+            <a:picLocks noChangeAspect="1"/>
+          </p:cNvPicPr>
+          <p:nvPr/>
+        </p:nvPicPr>
+        <p:blipFill>
+          <a:blip r:embed="rId2"/>
+          <a:stretch>
+            <a:fillRect/>
+          </a:stretch>
+        </p:blipFill>
+        <p:spPr>
+          <a:xfrm>
+            <a:off x="6889071" y="2219417"/>
+            <a:ext cx="5078027" cy="4261964"/>
+          </a:xfrm>
+          <a:prstGeom prst="rect">
+            <a:avLst/>
+          </a:prstGeom>
+        </p:spPr>
+      </p:pic>
     </p:spTree>
     <p:extLst>
       <p:ext uri="{BB962C8B-B14F-4D97-AF65-F5344CB8AC3E}">
@@ -8158,6 +8882,179 @@
 </file>
 
 <file path=ppt/slides/slide4.xml><?xml version="1.0" encoding="utf-8"?>
+<p:sld xmlns:a="http://schemas.openxmlformats.org/drawingml/2006/main" xmlns:r="http://schemas.openxmlformats.org/officeDocument/2006/relationships" xmlns:p="http://schemas.openxmlformats.org/presentationml/2006/main">
+  <p:cSld>
+    <p:spTree>
+      <p:nvGrpSpPr>
+        <p:cNvPr id="1" name=""/>
+        <p:cNvGrpSpPr/>
+        <p:nvPr/>
+      </p:nvGrpSpPr>
+      <p:grpSpPr>
+        <a:xfrm>
+          <a:off x="0" y="0"/>
+          <a:ext cx="0" cy="0"/>
+          <a:chOff x="0" y="0"/>
+          <a:chExt cx="0" cy="0"/>
+        </a:xfrm>
+      </p:grpSpPr>
+      <p:sp>
+        <p:nvSpPr>
+          <p:cNvPr id="2" name="Title 1">
+            <a:extLst>
+              <a:ext uri="{FF2B5EF4-FFF2-40B4-BE49-F238E27FC236}">
+                <a16:creationId xmlns:a16="http://schemas.microsoft.com/office/drawing/2014/main" id="{4499B349-6D28-4CFF-BE66-18670B444F9F}"/>
+              </a:ext>
+            </a:extLst>
+          </p:cNvPr>
+          <p:cNvSpPr>
+            <a:spLocks noGrp="1"/>
+          </p:cNvSpPr>
+          <p:nvPr>
+            <p:ph type="title"/>
+          </p:nvPr>
+        </p:nvSpPr>
+        <p:spPr/>
+        <p:txBody>
+          <a:bodyPr/>
+          <a:lstStyle/>
+          <a:p>
+            <a:r>
+              <a:rPr lang="en-US" dirty="0" err="1"/>
+              <a:t>Liên</a:t>
+            </a:r>
+            <a:r>
+              <a:rPr lang="en-US" dirty="0"/>
+              <a:t> </a:t>
+            </a:r>
+            <a:r>
+              <a:rPr lang="en-US" dirty="0" err="1"/>
+              <a:t>hệ</a:t>
+            </a:r>
+            <a:r>
+              <a:rPr lang="en-US" dirty="0"/>
+              <a:t>	</a:t>
+            </a:r>
+          </a:p>
+        </p:txBody>
+      </p:sp>
+      <p:sp>
+        <p:nvSpPr>
+          <p:cNvPr id="3" name="Content Placeholder 2">
+            <a:extLst>
+              <a:ext uri="{FF2B5EF4-FFF2-40B4-BE49-F238E27FC236}">
+                <a16:creationId xmlns:a16="http://schemas.microsoft.com/office/drawing/2014/main" id="{7C75058E-13E9-4EB9-97DD-84F947E13FEB}"/>
+              </a:ext>
+            </a:extLst>
+          </p:cNvPr>
+          <p:cNvSpPr>
+            <a:spLocks noGrp="1"/>
+          </p:cNvSpPr>
+          <p:nvPr>
+            <p:ph idx="1"/>
+          </p:nvPr>
+        </p:nvSpPr>
+        <p:spPr/>
+        <p:txBody>
+          <a:bodyPr/>
+          <a:lstStyle/>
+          <a:p>
+            <a:r>
+              <a:rPr lang="en-US" dirty="0" err="1"/>
+              <a:t>Liên</a:t>
+            </a:r>
+            <a:r>
+              <a:rPr lang="en-US" dirty="0"/>
+              <a:t> </a:t>
+            </a:r>
+            <a:r>
+              <a:rPr lang="en-US" dirty="0" err="1"/>
+              <a:t>hệ</a:t>
+            </a:r>
+            <a:r>
+              <a:rPr lang="en-US" dirty="0"/>
+              <a:t> </a:t>
+            </a:r>
+            <a:r>
+              <a:rPr lang="en-US" dirty="0" err="1"/>
+              <a:t>với</a:t>
+            </a:r>
+            <a:r>
+              <a:rPr lang="en-US" dirty="0"/>
+              <a:t> </a:t>
+            </a:r>
+            <a:r>
+              <a:rPr lang="en-US" dirty="0" err="1"/>
+              <a:t>chúng</a:t>
+            </a:r>
+            <a:r>
+              <a:rPr lang="en-US" dirty="0"/>
+              <a:t> </a:t>
+            </a:r>
+            <a:r>
+              <a:rPr lang="en-US" dirty="0" err="1"/>
+              <a:t>tôi</a:t>
+            </a:r>
+            <a:r>
+              <a:rPr lang="en-US" dirty="0"/>
+              <a:t>:</a:t>
+            </a:r>
+          </a:p>
+          <a:p>
+            <a:pPr marL="36900" indent="0">
+              <a:buNone/>
+            </a:pPr>
+            <a:r>
+              <a:rPr lang="en-US" dirty="0"/>
+              <a:t> </a:t>
+            </a:r>
+          </a:p>
+        </p:txBody>
+      </p:sp>
+      <p:pic>
+        <p:nvPicPr>
+          <p:cNvPr id="4" name="Picture 3">
+            <a:extLst>
+              <a:ext uri="{FF2B5EF4-FFF2-40B4-BE49-F238E27FC236}">
+                <a16:creationId xmlns:a16="http://schemas.microsoft.com/office/drawing/2014/main" id="{A4D356CE-2DFC-485E-ABD2-E4F10C405174}"/>
+              </a:ext>
+            </a:extLst>
+          </p:cNvPr>
+          <p:cNvPicPr>
+            <a:picLocks noChangeAspect="1"/>
+          </p:cNvPicPr>
+          <p:nvPr/>
+        </p:nvPicPr>
+        <p:blipFill>
+          <a:blip r:embed="rId2"/>
+          <a:stretch>
+            <a:fillRect/>
+          </a:stretch>
+        </p:blipFill>
+        <p:spPr>
+          <a:xfrm>
+            <a:off x="4145872" y="2347831"/>
+            <a:ext cx="7026318" cy="3895454"/>
+          </a:xfrm>
+          <a:prstGeom prst="rect">
+            <a:avLst/>
+          </a:prstGeom>
+        </p:spPr>
+      </p:pic>
+    </p:spTree>
+    <p:extLst>
+      <p:ext uri="{BB962C8B-B14F-4D97-AF65-F5344CB8AC3E}">
+        <p14:creationId xmlns:p14="http://schemas.microsoft.com/office/powerpoint/2010/main" val="1990633851"/>
+      </p:ext>
+    </p:extLst>
+  </p:cSld>
+  <p:clrMapOvr>
+    <a:masterClrMapping/>
+  </p:clrMapOvr>
+</p:sld>
+</file>
+
+<file path=ppt/slides/slide5.xml><?xml version="1.0" encoding="utf-8"?>
 <p:sld xmlns:a="http://schemas.openxmlformats.org/drawingml/2006/main" xmlns:r="http://schemas.openxmlformats.org/officeDocument/2006/relationships" xmlns:p="http://schemas.openxmlformats.org/presentationml/2006/main">
   <p:cSld>
     <p:spTree>
@@ -8803,7 +9700,7 @@
 </p:sld>
 </file>
 
-<file path=ppt/slides/slide5.xml><?xml version="1.0" encoding="utf-8"?>
+<file path=ppt/slides/slide6.xml><?xml version="1.0" encoding="utf-8"?>
 <p:sld xmlns:a="http://schemas.openxmlformats.org/drawingml/2006/main" xmlns:r="http://schemas.openxmlformats.org/officeDocument/2006/relationships" xmlns:p="http://schemas.openxmlformats.org/presentationml/2006/main">
   <p:cSld>
     <p:spTree>
@@ -9488,7 +10385,7 @@
 </p:sld>
 </file>
 
-<file path=ppt/slides/slide6.xml><?xml version="1.0" encoding="utf-8"?>
+<file path=ppt/slides/slide7.xml><?xml version="1.0" encoding="utf-8"?>
 <p:sld xmlns:a="http://schemas.openxmlformats.org/drawingml/2006/main" xmlns:r="http://schemas.openxmlformats.org/officeDocument/2006/relationships" xmlns:p="http://schemas.openxmlformats.org/presentationml/2006/main">
   <p:cSld>
     <p:spTree>
@@ -10019,7 +10916,7 @@
 </p:sld>
 </file>
 
-<file path=ppt/slides/slide7.xml><?xml version="1.0" encoding="utf-8"?>
+<file path=ppt/slides/slide8.xml><?xml version="1.0" encoding="utf-8"?>
 <p:sld xmlns:a="http://schemas.openxmlformats.org/drawingml/2006/main" xmlns:r="http://schemas.openxmlformats.org/officeDocument/2006/relationships" xmlns:p="http://schemas.openxmlformats.org/presentationml/2006/main">
   <p:cSld>
     <p:spTree>
@@ -10245,7 +11142,7 @@
 </p:sld>
 </file>
 
-<file path=ppt/slides/slide8.xml><?xml version="1.0" encoding="utf-8"?>
+<file path=ppt/slides/slide9.xml><?xml version="1.0" encoding="utf-8"?>
 <p:sld xmlns:a="http://schemas.openxmlformats.org/drawingml/2006/main" xmlns:r="http://schemas.openxmlformats.org/officeDocument/2006/relationships" xmlns:p="http://schemas.openxmlformats.org/presentationml/2006/main">
   <p:cSld>
     <p:spTree>
@@ -10607,366 +11504,6 @@
     <p:extLst>
       <p:ext uri="{BB962C8B-B14F-4D97-AF65-F5344CB8AC3E}">
         <p14:creationId xmlns:p14="http://schemas.microsoft.com/office/powerpoint/2010/main" val="444574348"/>
-      </p:ext>
-    </p:extLst>
-  </p:cSld>
-  <p:clrMapOvr>
-    <a:masterClrMapping/>
-  </p:clrMapOvr>
-</p:sld>
-</file>
-
-<file path=ppt/slides/slide9.xml><?xml version="1.0" encoding="utf-8"?>
-<p:sld xmlns:a="http://schemas.openxmlformats.org/drawingml/2006/main" xmlns:r="http://schemas.openxmlformats.org/officeDocument/2006/relationships" xmlns:p="http://schemas.openxmlformats.org/presentationml/2006/main">
-  <p:cSld>
-    <p:spTree>
-      <p:nvGrpSpPr>
-        <p:cNvPr id="1" name=""/>
-        <p:cNvGrpSpPr/>
-        <p:nvPr/>
-      </p:nvGrpSpPr>
-      <p:grpSpPr>
-        <a:xfrm>
-          <a:off x="0" y="0"/>
-          <a:ext cx="0" cy="0"/>
-          <a:chOff x="0" y="0"/>
-          <a:chExt cx="0" cy="0"/>
-        </a:xfrm>
-      </p:grpSpPr>
-      <p:sp>
-        <p:nvSpPr>
-          <p:cNvPr id="2" name="Title 1">
-            <a:extLst>
-              <a:ext uri="{FF2B5EF4-FFF2-40B4-BE49-F238E27FC236}">
-                <a16:creationId xmlns:a16="http://schemas.microsoft.com/office/drawing/2014/main" id="{E10E3F3B-30B1-4DE7-89A2-F52DE12DCBA7}"/>
-              </a:ext>
-            </a:extLst>
-          </p:cNvPr>
-          <p:cNvSpPr>
-            <a:spLocks noGrp="1"/>
-          </p:cNvSpPr>
-          <p:nvPr>
-            <p:ph type="title"/>
-          </p:nvPr>
-        </p:nvSpPr>
-        <p:spPr/>
-        <p:txBody>
-          <a:bodyPr/>
-          <a:lstStyle/>
-          <a:p>
-            <a:r>
-              <a:rPr lang="en-US" dirty="0">
-                <a:latin typeface="Arial" panose="020B0604020202020204" pitchFamily="34" charset="0"/>
-                <a:cs typeface="Arial" panose="020B0604020202020204" pitchFamily="34" charset="0"/>
-              </a:rPr>
-              <a:t>CRUD </a:t>
-            </a:r>
-            <a:r>
-              <a:rPr lang="en-US" dirty="0" err="1">
-                <a:latin typeface="Arial" panose="020B0604020202020204" pitchFamily="34" charset="0"/>
-                <a:cs typeface="Arial" panose="020B0604020202020204" pitchFamily="34" charset="0"/>
-              </a:rPr>
-              <a:t>Bài</a:t>
-            </a:r>
-            <a:r>
-              <a:rPr lang="en-US" dirty="0">
-                <a:latin typeface="Arial" panose="020B0604020202020204" pitchFamily="34" charset="0"/>
-                <a:cs typeface="Arial" panose="020B0604020202020204" pitchFamily="34" charset="0"/>
-              </a:rPr>
-              <a:t> </a:t>
-            </a:r>
-            <a:r>
-              <a:rPr lang="en-US" dirty="0" err="1">
-                <a:latin typeface="Arial" panose="020B0604020202020204" pitchFamily="34" charset="0"/>
-                <a:cs typeface="Arial" panose="020B0604020202020204" pitchFamily="34" charset="0"/>
-              </a:rPr>
-              <a:t>viết</a:t>
-            </a:r>
-            <a:r>
-              <a:rPr lang="en-US" dirty="0">
-                <a:latin typeface="Arial" panose="020B0604020202020204" pitchFamily="34" charset="0"/>
-                <a:cs typeface="Arial" panose="020B0604020202020204" pitchFamily="34" charset="0"/>
-              </a:rPr>
-              <a:t>(4)</a:t>
-            </a:r>
-          </a:p>
-        </p:txBody>
-      </p:sp>
-      <p:sp>
-        <p:nvSpPr>
-          <p:cNvPr id="3" name="Content Placeholder 2">
-            <a:extLst>
-              <a:ext uri="{FF2B5EF4-FFF2-40B4-BE49-F238E27FC236}">
-                <a16:creationId xmlns:a16="http://schemas.microsoft.com/office/drawing/2014/main" id="{C9D1A361-AB7C-46C0-8D79-1F1474F25B07}"/>
-              </a:ext>
-            </a:extLst>
-          </p:cNvPr>
-          <p:cNvSpPr>
-            <a:spLocks noGrp="1"/>
-          </p:cNvSpPr>
-          <p:nvPr>
-            <p:ph idx="1"/>
-          </p:nvPr>
-        </p:nvSpPr>
-        <p:spPr/>
-        <p:txBody>
-          <a:bodyPr/>
-          <a:lstStyle/>
-          <a:p>
-            <a:r>
-              <a:rPr lang="en-US" dirty="0" err="1">
-                <a:latin typeface="Times New Roman" panose="02020603050405020304" pitchFamily="18" charset="0"/>
-                <a:cs typeface="Times New Roman" panose="02020603050405020304" pitchFamily="18" charset="0"/>
-              </a:rPr>
-              <a:t>Phân</a:t>
-            </a:r>
-            <a:r>
-              <a:rPr lang="en-US" dirty="0">
-                <a:latin typeface="Times New Roman" panose="02020603050405020304" pitchFamily="18" charset="0"/>
-                <a:cs typeface="Times New Roman" panose="02020603050405020304" pitchFamily="18" charset="0"/>
-              </a:rPr>
-              <a:t> </a:t>
-            </a:r>
-            <a:r>
-              <a:rPr lang="en-US" dirty="0" err="1">
-                <a:latin typeface="Times New Roman" panose="02020603050405020304" pitchFamily="18" charset="0"/>
-                <a:cs typeface="Times New Roman" panose="02020603050405020304" pitchFamily="18" charset="0"/>
-              </a:rPr>
-              <a:t>trang</a:t>
-            </a:r>
-            <a:endParaRPr lang="en-US" dirty="0">
-              <a:latin typeface="Times New Roman" panose="02020603050405020304" pitchFamily="18" charset="0"/>
-              <a:cs typeface="Times New Roman" panose="02020603050405020304" pitchFamily="18" charset="0"/>
-            </a:endParaRPr>
-          </a:p>
-          <a:p>
-            <a:pPr marL="36900" indent="0">
-              <a:buNone/>
-            </a:pPr>
-            <a:r>
-              <a:rPr lang="en-US" dirty="0" err="1">
-                <a:latin typeface="Times New Roman" panose="02020603050405020304" pitchFamily="18" charset="0"/>
-                <a:cs typeface="Times New Roman" panose="02020603050405020304" pitchFamily="18" charset="0"/>
-              </a:rPr>
-              <a:t>Mặc</a:t>
-            </a:r>
-            <a:r>
-              <a:rPr lang="en-US" dirty="0">
-                <a:latin typeface="Times New Roman" panose="02020603050405020304" pitchFamily="18" charset="0"/>
-                <a:cs typeface="Times New Roman" panose="02020603050405020304" pitchFamily="18" charset="0"/>
-              </a:rPr>
-              <a:t> </a:t>
-            </a:r>
-            <a:r>
-              <a:rPr lang="en-US" dirty="0" err="1">
-                <a:latin typeface="Times New Roman" panose="02020603050405020304" pitchFamily="18" charset="0"/>
-                <a:cs typeface="Times New Roman" panose="02020603050405020304" pitchFamily="18" charset="0"/>
-              </a:rPr>
-              <a:t>định</a:t>
-            </a:r>
-            <a:r>
-              <a:rPr lang="en-US" dirty="0">
-                <a:latin typeface="Times New Roman" panose="02020603050405020304" pitchFamily="18" charset="0"/>
-                <a:cs typeface="Times New Roman" panose="02020603050405020304" pitchFamily="18" charset="0"/>
-              </a:rPr>
-              <a:t> </a:t>
-            </a:r>
-            <a:r>
-              <a:rPr lang="en-US" dirty="0" err="1">
-                <a:latin typeface="Times New Roman" panose="02020603050405020304" pitchFamily="18" charset="0"/>
-                <a:cs typeface="Times New Roman" panose="02020603050405020304" pitchFamily="18" charset="0"/>
-              </a:rPr>
-              <a:t>sử</a:t>
-            </a:r>
-            <a:r>
-              <a:rPr lang="en-US" dirty="0">
-                <a:latin typeface="Times New Roman" panose="02020603050405020304" pitchFamily="18" charset="0"/>
-                <a:cs typeface="Times New Roman" panose="02020603050405020304" pitchFamily="18" charset="0"/>
-              </a:rPr>
-              <a:t> </a:t>
-            </a:r>
-            <a:r>
-              <a:rPr lang="en-US" dirty="0" err="1">
-                <a:latin typeface="Times New Roman" panose="02020603050405020304" pitchFamily="18" charset="0"/>
-                <a:cs typeface="Times New Roman" panose="02020603050405020304" pitchFamily="18" charset="0"/>
-              </a:rPr>
-              <a:t>dụng</a:t>
-            </a:r>
-            <a:r>
-              <a:rPr lang="en-US" dirty="0">
-                <a:latin typeface="Times New Roman" panose="02020603050405020304" pitchFamily="18" charset="0"/>
-                <a:cs typeface="Times New Roman" panose="02020603050405020304" pitchFamily="18" charset="0"/>
-              </a:rPr>
-              <a:t> </a:t>
-            </a:r>
-            <a:r>
-              <a:rPr lang="en-US" dirty="0" err="1">
-                <a:latin typeface="Times New Roman" panose="02020603050405020304" pitchFamily="18" charset="0"/>
-                <a:cs typeface="Times New Roman" panose="02020603050405020304" pitchFamily="18" charset="0"/>
-              </a:rPr>
-              <a:t>PageSize</a:t>
-            </a:r>
-            <a:r>
-              <a:rPr lang="en-US" dirty="0">
-                <a:latin typeface="Times New Roman" panose="02020603050405020304" pitchFamily="18" charset="0"/>
-                <a:cs typeface="Times New Roman" panose="02020603050405020304" pitchFamily="18" charset="0"/>
-              </a:rPr>
-              <a:t> </a:t>
-            </a:r>
-            <a:r>
-              <a:rPr lang="en-US" dirty="0" err="1">
-                <a:latin typeface="Times New Roman" panose="02020603050405020304" pitchFamily="18" charset="0"/>
-                <a:cs typeface="Times New Roman" panose="02020603050405020304" pitchFamily="18" charset="0"/>
-              </a:rPr>
-              <a:t>tại</a:t>
-            </a:r>
-            <a:r>
-              <a:rPr lang="en-US" dirty="0">
-                <a:latin typeface="Times New Roman" panose="02020603050405020304" pitchFamily="18" charset="0"/>
-                <a:cs typeface="Times New Roman" panose="02020603050405020304" pitchFamily="18" charset="0"/>
-              </a:rPr>
-              <a:t> config</a:t>
-            </a:r>
-          </a:p>
-          <a:p>
-            <a:pPr marL="36900" indent="0">
-              <a:buNone/>
-            </a:pPr>
-            <a:r>
-              <a:rPr lang="en-US" dirty="0" err="1">
-                <a:latin typeface="Times New Roman" panose="02020603050405020304" pitchFamily="18" charset="0"/>
-                <a:cs typeface="Times New Roman" panose="02020603050405020304" pitchFamily="18" charset="0"/>
-              </a:rPr>
-              <a:t>Có</a:t>
-            </a:r>
-            <a:r>
-              <a:rPr lang="en-US" dirty="0">
-                <a:latin typeface="Times New Roman" panose="02020603050405020304" pitchFamily="18" charset="0"/>
-                <a:cs typeface="Times New Roman" panose="02020603050405020304" pitchFamily="18" charset="0"/>
-              </a:rPr>
-              <a:t> </a:t>
-            </a:r>
-            <a:r>
-              <a:rPr lang="en-US" dirty="0" err="1">
-                <a:latin typeface="Times New Roman" panose="02020603050405020304" pitchFamily="18" charset="0"/>
-                <a:cs typeface="Times New Roman" panose="02020603050405020304" pitchFamily="18" charset="0"/>
-              </a:rPr>
-              <a:t>thể</a:t>
-            </a:r>
-            <a:r>
-              <a:rPr lang="en-US" dirty="0">
-                <a:latin typeface="Times New Roman" panose="02020603050405020304" pitchFamily="18" charset="0"/>
-                <a:cs typeface="Times New Roman" panose="02020603050405020304" pitchFamily="18" charset="0"/>
-              </a:rPr>
-              <a:t> </a:t>
-            </a:r>
-            <a:r>
-              <a:rPr lang="en-US" dirty="0" err="1">
-                <a:latin typeface="Times New Roman" panose="02020603050405020304" pitchFamily="18" charset="0"/>
-                <a:cs typeface="Times New Roman" panose="02020603050405020304" pitchFamily="18" charset="0"/>
-              </a:rPr>
-              <a:t>thay</a:t>
-            </a:r>
-            <a:r>
-              <a:rPr lang="en-US" dirty="0">
-                <a:latin typeface="Times New Roman" panose="02020603050405020304" pitchFamily="18" charset="0"/>
-                <a:cs typeface="Times New Roman" panose="02020603050405020304" pitchFamily="18" charset="0"/>
-              </a:rPr>
-              <a:t> </a:t>
-            </a:r>
-            <a:r>
-              <a:rPr lang="en-US" dirty="0" err="1">
-                <a:latin typeface="Times New Roman" panose="02020603050405020304" pitchFamily="18" charset="0"/>
-                <a:cs typeface="Times New Roman" panose="02020603050405020304" pitchFamily="18" charset="0"/>
-              </a:rPr>
-              <a:t>đổi</a:t>
-            </a:r>
-            <a:r>
-              <a:rPr lang="en-US" dirty="0">
-                <a:latin typeface="Times New Roman" panose="02020603050405020304" pitchFamily="18" charset="0"/>
-                <a:cs typeface="Times New Roman" panose="02020603050405020304" pitchFamily="18" charset="0"/>
-              </a:rPr>
-              <a:t> </a:t>
-            </a:r>
-            <a:r>
-              <a:rPr lang="en-US" dirty="0" err="1">
-                <a:latin typeface="Times New Roman" panose="02020603050405020304" pitchFamily="18" charset="0"/>
-                <a:cs typeface="Times New Roman" panose="02020603050405020304" pitchFamily="18" charset="0"/>
-              </a:rPr>
-              <a:t>pageSize</a:t>
-            </a:r>
-            <a:r>
-              <a:rPr lang="en-US" dirty="0">
-                <a:latin typeface="Times New Roman" panose="02020603050405020304" pitchFamily="18" charset="0"/>
-                <a:cs typeface="Times New Roman" panose="02020603050405020304" pitchFamily="18" charset="0"/>
-              </a:rPr>
-              <a:t> </a:t>
-            </a:r>
-            <a:r>
-              <a:rPr lang="en-US" dirty="0" err="1">
-                <a:latin typeface="Times New Roman" panose="02020603050405020304" pitchFamily="18" charset="0"/>
-                <a:cs typeface="Times New Roman" panose="02020603050405020304" pitchFamily="18" charset="0"/>
-              </a:rPr>
-              <a:t>ngay</a:t>
-            </a:r>
-            <a:r>
-              <a:rPr lang="en-US" dirty="0">
-                <a:latin typeface="Times New Roman" panose="02020603050405020304" pitchFamily="18" charset="0"/>
-                <a:cs typeface="Times New Roman" panose="02020603050405020304" pitchFamily="18" charset="0"/>
-              </a:rPr>
-              <a:t> </a:t>
-            </a:r>
-            <a:r>
-              <a:rPr lang="en-US" dirty="0" err="1">
-                <a:latin typeface="Times New Roman" panose="02020603050405020304" pitchFamily="18" charset="0"/>
-                <a:cs typeface="Times New Roman" panose="02020603050405020304" pitchFamily="18" charset="0"/>
-              </a:rPr>
-              <a:t>trên</a:t>
-            </a:r>
-            <a:r>
-              <a:rPr lang="en-US" dirty="0">
-                <a:latin typeface="Times New Roman" panose="02020603050405020304" pitchFamily="18" charset="0"/>
-                <a:cs typeface="Times New Roman" panose="02020603050405020304" pitchFamily="18" charset="0"/>
-              </a:rPr>
-              <a:t> index</a:t>
-            </a:r>
-          </a:p>
-        </p:txBody>
-      </p:sp>
-      <p:pic>
-        <p:nvPicPr>
-          <p:cNvPr id="4" name="Picture 3">
-            <a:extLst>
-              <a:ext uri="{FF2B5EF4-FFF2-40B4-BE49-F238E27FC236}">
-                <a16:creationId xmlns:a16="http://schemas.microsoft.com/office/drawing/2014/main" id="{A72419BC-62F3-4A28-AC08-7CC13FFD3D47}"/>
-              </a:ext>
-            </a:extLst>
-          </p:cNvPr>
-          <p:cNvPicPr>
-            <a:picLocks noChangeAspect="1"/>
-          </p:cNvPicPr>
-          <p:nvPr/>
-        </p:nvPicPr>
-        <p:blipFill>
-          <a:blip r:embed="rId2"/>
-          <a:stretch>
-            <a:fillRect/>
-          </a:stretch>
-        </p:blipFill>
-        <p:spPr>
-          <a:xfrm>
-            <a:off x="1045029" y="3788229"/>
-            <a:ext cx="10142375" cy="2883159"/>
-          </a:xfrm>
-          <a:prstGeom prst="rect">
-            <a:avLst/>
-          </a:prstGeom>
-        </p:spPr>
-      </p:pic>
-    </p:spTree>
-    <p:extLst>
-      <p:ext uri="{BB962C8B-B14F-4D97-AF65-F5344CB8AC3E}">
-        <p14:creationId xmlns:p14="http://schemas.microsoft.com/office/powerpoint/2010/main" val="203599150"/>
       </p:ext>
     </p:extLst>
   </p:cSld>

</xml_diff>